<commit_message>
Update Carpentries email address
</commit_message>
<xml_diff>
--- a/Data Carpentry Wrap-Up.pptx
+++ b/Data Carpentry Wrap-Up.pptx
@@ -209,7 +209,7 @@
           <a:p>
             <a:fld id="{FDBF2507-0032-4C44-A0C6-E2625D8E8B3E}" type="datetimeFigureOut">
               <a:rPr lang="en-US" smtClean="0"/>
-              <a:t>6/2/2021</a:t>
+              <a:t>12/17/2021</a:t>
             </a:fld>
             <a:endParaRPr lang="en-US"/>
           </a:p>
@@ -2054,7 +2054,7 @@
             <a:fld id="{48A87A34-81AB-432B-8DAE-1953F412C126}" type="datetimeFigureOut">
               <a:rPr lang="en-US" dirty="0"/>
               <a:pPr/>
-              <a:t>6/2/2021</a:t>
+              <a:t>12/17/2021</a:t>
             </a:fld>
             <a:endParaRPr lang="en-US" dirty="0"/>
           </a:p>
@@ -3508,7 +3508,7 @@
           <a:p>
             <a:fld id="{48A87A34-81AB-432B-8DAE-1953F412C126}" type="datetimeFigureOut">
               <a:rPr lang="en-US" dirty="0"/>
-              <a:t>6/2/2021</a:t>
+              <a:t>12/17/2021</a:t>
             </a:fld>
             <a:endParaRPr lang="en-US" dirty="0"/>
           </a:p>
@@ -4956,7 +4956,7 @@
           <a:p>
             <a:fld id="{48A87A34-81AB-432B-8DAE-1953F412C126}" type="datetimeFigureOut">
               <a:rPr lang="en-US" dirty="0"/>
-              <a:t>6/2/2021</a:t>
+              <a:t>12/17/2021</a:t>
             </a:fld>
             <a:endParaRPr lang="en-US" dirty="0"/>
           </a:p>
@@ -6406,7 +6406,7 @@
           <a:p>
             <a:fld id="{48A87A34-81AB-432B-8DAE-1953F412C126}" type="datetimeFigureOut">
               <a:rPr lang="en-US" dirty="0"/>
-              <a:t>6/2/2021</a:t>
+              <a:t>12/17/2021</a:t>
             </a:fld>
             <a:endParaRPr lang="en-US" dirty="0"/>
           </a:p>
@@ -7909,7 +7909,7 @@
           <a:p>
             <a:fld id="{48A87A34-81AB-432B-8DAE-1953F412C126}" type="datetimeFigureOut">
               <a:rPr lang="en-US" dirty="0"/>
-              <a:t>6/2/2021</a:t>
+              <a:t>12/17/2021</a:t>
             </a:fld>
             <a:endParaRPr lang="en-US" dirty="0"/>
           </a:p>
@@ -9425,7 +9425,7 @@
           <a:p>
             <a:fld id="{48A87A34-81AB-432B-8DAE-1953F412C126}" type="datetimeFigureOut">
               <a:rPr lang="en-US" dirty="0"/>
-              <a:t>6/2/2021</a:t>
+              <a:t>12/17/2021</a:t>
             </a:fld>
             <a:endParaRPr lang="en-US" dirty="0"/>
           </a:p>
@@ -11085,7 +11085,7 @@
           <a:p>
             <a:fld id="{48A87A34-81AB-432B-8DAE-1953F412C126}" type="datetimeFigureOut">
               <a:rPr lang="en-US" dirty="0"/>
-              <a:t>6/2/2021</a:t>
+              <a:t>12/17/2021</a:t>
             </a:fld>
             <a:endParaRPr lang="en-US" dirty="0"/>
           </a:p>
@@ -12478,7 +12478,7 @@
           <a:p>
             <a:fld id="{48A87A34-81AB-432B-8DAE-1953F412C126}" type="datetimeFigureOut">
               <a:rPr lang="en-US" dirty="0"/>
-              <a:t>6/2/2021</a:t>
+              <a:t>12/17/2021</a:t>
             </a:fld>
             <a:endParaRPr lang="en-US" dirty="0"/>
           </a:p>
@@ -12573,7 +12573,7 @@
           <a:p>
             <a:fld id="{48A87A34-81AB-432B-8DAE-1953F412C126}" type="datetimeFigureOut">
               <a:rPr lang="en-US" dirty="0"/>
-              <a:t>6/2/2021</a:t>
+              <a:t>12/17/2021</a:t>
             </a:fld>
             <a:endParaRPr lang="en-US" dirty="0"/>
           </a:p>
@@ -14094,7 +14094,7 @@
           <a:p>
             <a:fld id="{48A87A34-81AB-432B-8DAE-1953F412C126}" type="datetimeFigureOut">
               <a:rPr lang="en-US" dirty="0"/>
-              <a:t>6/2/2021</a:t>
+              <a:t>12/17/2021</a:t>
             </a:fld>
             <a:endParaRPr lang="en-US" dirty="0"/>
           </a:p>
@@ -15625,7 +15625,7 @@
           <a:p>
             <a:fld id="{48A87A34-81AB-432B-8DAE-1953F412C126}" type="datetimeFigureOut">
               <a:rPr lang="en-US" dirty="0"/>
-              <a:t>6/2/2021</a:t>
+              <a:t>12/17/2021</a:t>
             </a:fld>
             <a:endParaRPr lang="en-US" dirty="0"/>
           </a:p>
@@ -15844,7 +15844,7 @@
             <a:fld id="{48A87A34-81AB-432B-8DAE-1953F412C126}" type="datetimeFigureOut">
               <a:rPr lang="en-US" dirty="0"/>
               <a:pPr/>
-              <a:t>6/2/2021</a:t>
+              <a:t>12/17/2021</a:t>
             </a:fld>
             <a:endParaRPr lang="en-US" dirty="0"/>
           </a:p>
@@ -16498,7 +16498,7 @@
           <a:p>
             <a:r>
               <a:rPr lang="en-US" dirty="0"/>
-              <a:t>SI Carpentries Brown Bag</a:t>
+              <a:t>SI Carpentries Community Chat</a:t>
             </a:r>
           </a:p>
         </p:txBody>
@@ -17385,7 +17385,7 @@
         </p:nvSpPr>
         <p:spPr>
           <a:xfrm>
-            <a:off x="5120878" y="803187"/>
+            <a:off x="5118445" y="232916"/>
             <a:ext cx="6269591" cy="2382651"/>
           </a:xfrm>
         </p:spPr>
@@ -17414,19 +17414,17 @@
       </p:sp>
       <p:pic>
         <p:nvPicPr>
-          <p:cNvPr id="10" name="Content Placeholder 3">
+          <p:cNvPr id="6" name="Picture 5">
             <a:extLst>
               <a:ext uri="{FF2B5EF4-FFF2-40B4-BE49-F238E27FC236}">
-                <a16:creationId xmlns:a16="http://schemas.microsoft.com/office/drawing/2014/main" id="{10C79A70-D9F3-4619-9F32-B644B41E63E2}"/>
+                <a16:creationId xmlns:a16="http://schemas.microsoft.com/office/drawing/2014/main" id="{B5F9D1D3-CB52-4D70-AD24-DB62727A3F12}"/>
               </a:ext>
             </a:extLst>
           </p:cNvPr>
           <p:cNvPicPr>
-            <a:picLocks noGrp="1" noChangeAspect="1"/>
+            <a:picLocks noChangeAspect="1"/>
           </p:cNvPicPr>
-          <p:nvPr>
-            <p:ph sz="half" idx="2"/>
-          </p:nvPr>
+          <p:nvPr/>
         </p:nvPicPr>
         <p:blipFill>
           <a:blip r:embed="rId4"/>
@@ -17436,20 +17434,24 @@
         </p:blipFill>
         <p:spPr>
           <a:xfrm>
-            <a:off x="5495852" y="1678025"/>
-            <a:ext cx="5519642" cy="4376788"/>
+            <a:off x="5407045" y="938906"/>
+            <a:ext cx="5692390" cy="5420707"/>
           </a:xfrm>
           <a:prstGeom prst="rect">
             <a:avLst/>
           </a:prstGeom>
           <a:ln>
-            <a:noFill/>
+            <a:solidFill>
+              <a:schemeClr val="bg1">
+                <a:lumMod val="65000"/>
+              </a:schemeClr>
+            </a:solidFill>
           </a:ln>
           <a:effectLst>
-            <a:outerShdw blurRad="292100" dist="139700" dir="2700000" algn="tl" rotWithShape="0">
-              <a:srgbClr val="333333">
-                <a:alpha val="65000"/>
-              </a:srgbClr>
+            <a:outerShdw blurRad="50800" dist="38100" dir="2700000" algn="tl" rotWithShape="0">
+              <a:prstClr val="black">
+                <a:alpha val="40000"/>
+              </a:prstClr>
             </a:outerShdw>
           </a:effectLst>
         </p:spPr>
@@ -17556,7 +17558,7 @@
               <a:rPr lang="en-US" sz="2800" dirty="0">
                 <a:hlinkClick r:id="rId3"/>
               </a:rPr>
-              <a:t>SI-DataScience@si.edu</a:t>
+              <a:t>Carpentries@si.edu</a:t>
             </a:r>
             <a:endParaRPr lang="en-US" sz="2800" dirty="0"/>
           </a:p>
@@ -17689,7 +17691,7 @@
               <a:buNone/>
             </a:pPr>
             <a:r>
-              <a:rPr lang="en-US" dirty="0"/>
+              <a:rPr lang="en-US" sz="2800" dirty="0"/>
               <a:t>Sign-up link is also available on the SI Carpentries Website</a:t>
             </a:r>
           </a:p>

</xml_diff>

<commit_message>
Updated instructor application form link
</commit_message>
<xml_diff>
--- a/Data Carpentry Wrap-Up.pptx
+++ b/Data Carpentry Wrap-Up.pptx
@@ -209,7 +209,7 @@
           <a:p>
             <a:fld id="{FDBF2507-0032-4C44-A0C6-E2625D8E8B3E}" type="datetimeFigureOut">
               <a:rPr lang="en-US" smtClean="0"/>
-              <a:t>12/17/2021</a:t>
+              <a:t>4/11/22</a:t>
             </a:fld>
             <a:endParaRPr lang="en-US"/>
           </a:p>
@@ -2054,7 +2054,7 @@
             <a:fld id="{48A87A34-81AB-432B-8DAE-1953F412C126}" type="datetimeFigureOut">
               <a:rPr lang="en-US" dirty="0"/>
               <a:pPr/>
-              <a:t>12/17/2021</a:t>
+              <a:t>4/11/22</a:t>
             </a:fld>
             <a:endParaRPr lang="en-US" dirty="0"/>
           </a:p>
@@ -3508,7 +3508,7 @@
           <a:p>
             <a:fld id="{48A87A34-81AB-432B-8DAE-1953F412C126}" type="datetimeFigureOut">
               <a:rPr lang="en-US" dirty="0"/>
-              <a:t>12/17/2021</a:t>
+              <a:t>4/11/22</a:t>
             </a:fld>
             <a:endParaRPr lang="en-US" dirty="0"/>
           </a:p>
@@ -4956,7 +4956,7 @@
           <a:p>
             <a:fld id="{48A87A34-81AB-432B-8DAE-1953F412C126}" type="datetimeFigureOut">
               <a:rPr lang="en-US" dirty="0"/>
-              <a:t>12/17/2021</a:t>
+              <a:t>4/11/22</a:t>
             </a:fld>
             <a:endParaRPr lang="en-US" dirty="0"/>
           </a:p>
@@ -6406,7 +6406,7 @@
           <a:p>
             <a:fld id="{48A87A34-81AB-432B-8DAE-1953F412C126}" type="datetimeFigureOut">
               <a:rPr lang="en-US" dirty="0"/>
-              <a:t>12/17/2021</a:t>
+              <a:t>4/11/22</a:t>
             </a:fld>
             <a:endParaRPr lang="en-US" dirty="0"/>
           </a:p>
@@ -7909,7 +7909,7 @@
           <a:p>
             <a:fld id="{48A87A34-81AB-432B-8DAE-1953F412C126}" type="datetimeFigureOut">
               <a:rPr lang="en-US" dirty="0"/>
-              <a:t>12/17/2021</a:t>
+              <a:t>4/11/22</a:t>
             </a:fld>
             <a:endParaRPr lang="en-US" dirty="0"/>
           </a:p>
@@ -9425,7 +9425,7 @@
           <a:p>
             <a:fld id="{48A87A34-81AB-432B-8DAE-1953F412C126}" type="datetimeFigureOut">
               <a:rPr lang="en-US" dirty="0"/>
-              <a:t>12/17/2021</a:t>
+              <a:t>4/11/22</a:t>
             </a:fld>
             <a:endParaRPr lang="en-US" dirty="0"/>
           </a:p>
@@ -11085,7 +11085,7 @@
           <a:p>
             <a:fld id="{48A87A34-81AB-432B-8DAE-1953F412C126}" type="datetimeFigureOut">
               <a:rPr lang="en-US" dirty="0"/>
-              <a:t>12/17/2021</a:t>
+              <a:t>4/11/22</a:t>
             </a:fld>
             <a:endParaRPr lang="en-US" dirty="0"/>
           </a:p>
@@ -12478,7 +12478,7 @@
           <a:p>
             <a:fld id="{48A87A34-81AB-432B-8DAE-1953F412C126}" type="datetimeFigureOut">
               <a:rPr lang="en-US" dirty="0"/>
-              <a:t>12/17/2021</a:t>
+              <a:t>4/11/22</a:t>
             </a:fld>
             <a:endParaRPr lang="en-US" dirty="0"/>
           </a:p>
@@ -12573,7 +12573,7 @@
           <a:p>
             <a:fld id="{48A87A34-81AB-432B-8DAE-1953F412C126}" type="datetimeFigureOut">
               <a:rPr lang="en-US" dirty="0"/>
-              <a:t>12/17/2021</a:t>
+              <a:t>4/11/22</a:t>
             </a:fld>
             <a:endParaRPr lang="en-US" dirty="0"/>
           </a:p>
@@ -14094,7 +14094,7 @@
           <a:p>
             <a:fld id="{48A87A34-81AB-432B-8DAE-1953F412C126}" type="datetimeFigureOut">
               <a:rPr lang="en-US" dirty="0"/>
-              <a:t>12/17/2021</a:t>
+              <a:t>4/11/22</a:t>
             </a:fld>
             <a:endParaRPr lang="en-US" dirty="0"/>
           </a:p>
@@ -15625,7 +15625,7 @@
           <a:p>
             <a:fld id="{48A87A34-81AB-432B-8DAE-1953F412C126}" type="datetimeFigureOut">
               <a:rPr lang="en-US" dirty="0"/>
-              <a:t>12/17/2021</a:t>
+              <a:t>4/11/22</a:t>
             </a:fld>
             <a:endParaRPr lang="en-US" dirty="0"/>
           </a:p>
@@ -15844,7 +15844,7 @@
             <a:fld id="{48A87A34-81AB-432B-8DAE-1953F412C126}" type="datetimeFigureOut">
               <a:rPr lang="en-US" dirty="0"/>
               <a:pPr/>
-              <a:t>12/17/2021</a:t>
+              <a:t>4/11/22</a:t>
             </a:fld>
             <a:endParaRPr lang="en-US" dirty="0"/>
           </a:p>
@@ -16540,7 +16540,7 @@
             </a:pPr>
             <a:r>
               <a:rPr lang="en-US" sz="2000" dirty="0"/>
-              <a:t>Fourth Thursday of every month from 1pm-2pm ET.</a:t>
+              <a:t>Last Wednesday of every month from 1pm-2pm ET.</a:t>
             </a:r>
           </a:p>
           <a:p>
@@ -16710,7 +16710,7 @@
               <a:rPr lang="en-US" sz="2400" dirty="0">
                 <a:hlinkClick r:id="rId2"/>
               </a:rPr>
-              <a:t>https://forms.gle/zghh323SJuq1QdKZ8</a:t>
+              <a:t>https://forms.office.com/r/Qi9xEmhGpY</a:t>
             </a:r>
             <a:endParaRPr lang="en-US" sz="2400" dirty="0"/>
           </a:p>

</xml_diff>